<commit_message>
vault backup: 2024-02-18 16:50:58
</commit_message>
<xml_diff>
--- a/Report Topics.pptx
+++ b/Report Topics.pptx
@@ -252,7 +252,7 @@
           <a:p>
             <a:fld id="{66FB8743-300C-4536-BAF1-F7DDC023FD1F}" type="datetimeFigureOut">
               <a:rPr lang="en-GB" smtClean="0"/>
-              <a:t>09/02/2024</a:t>
+              <a:t>16/02/2024</a:t>
             </a:fld>
             <a:endParaRPr lang="en-GB"/>
           </a:p>
@@ -422,7 +422,7 @@
           <a:p>
             <a:fld id="{66FB8743-300C-4536-BAF1-F7DDC023FD1F}" type="datetimeFigureOut">
               <a:rPr lang="en-GB" smtClean="0"/>
-              <a:t>09/02/2024</a:t>
+              <a:t>16/02/2024</a:t>
             </a:fld>
             <a:endParaRPr lang="en-GB"/>
           </a:p>
@@ -602,7 +602,7 @@
           <a:p>
             <a:fld id="{66FB8743-300C-4536-BAF1-F7DDC023FD1F}" type="datetimeFigureOut">
               <a:rPr lang="en-GB" smtClean="0"/>
-              <a:t>09/02/2024</a:t>
+              <a:t>16/02/2024</a:t>
             </a:fld>
             <a:endParaRPr lang="en-GB"/>
           </a:p>
@@ -772,7 +772,7 @@
           <a:p>
             <a:fld id="{66FB8743-300C-4536-BAF1-F7DDC023FD1F}" type="datetimeFigureOut">
               <a:rPr lang="en-GB" smtClean="0"/>
-              <a:t>09/02/2024</a:t>
+              <a:t>16/02/2024</a:t>
             </a:fld>
             <a:endParaRPr lang="en-GB"/>
           </a:p>
@@ -1018,7 +1018,7 @@
           <a:p>
             <a:fld id="{66FB8743-300C-4536-BAF1-F7DDC023FD1F}" type="datetimeFigureOut">
               <a:rPr lang="en-GB" smtClean="0"/>
-              <a:t>09/02/2024</a:t>
+              <a:t>16/02/2024</a:t>
             </a:fld>
             <a:endParaRPr lang="en-GB"/>
           </a:p>
@@ -1250,7 +1250,7 @@
           <a:p>
             <a:fld id="{66FB8743-300C-4536-BAF1-F7DDC023FD1F}" type="datetimeFigureOut">
               <a:rPr lang="en-GB" smtClean="0"/>
-              <a:t>09/02/2024</a:t>
+              <a:t>16/02/2024</a:t>
             </a:fld>
             <a:endParaRPr lang="en-GB"/>
           </a:p>
@@ -1617,7 +1617,7 @@
           <a:p>
             <a:fld id="{66FB8743-300C-4536-BAF1-F7DDC023FD1F}" type="datetimeFigureOut">
               <a:rPr lang="en-GB" smtClean="0"/>
-              <a:t>09/02/2024</a:t>
+              <a:t>16/02/2024</a:t>
             </a:fld>
             <a:endParaRPr lang="en-GB"/>
           </a:p>
@@ -1735,7 +1735,7 @@
           <a:p>
             <a:fld id="{66FB8743-300C-4536-BAF1-F7DDC023FD1F}" type="datetimeFigureOut">
               <a:rPr lang="en-GB" smtClean="0"/>
-              <a:t>09/02/2024</a:t>
+              <a:t>16/02/2024</a:t>
             </a:fld>
             <a:endParaRPr lang="en-GB"/>
           </a:p>
@@ -1830,7 +1830,7 @@
           <a:p>
             <a:fld id="{66FB8743-300C-4536-BAF1-F7DDC023FD1F}" type="datetimeFigureOut">
               <a:rPr lang="en-GB" smtClean="0"/>
-              <a:t>09/02/2024</a:t>
+              <a:t>16/02/2024</a:t>
             </a:fld>
             <a:endParaRPr lang="en-GB"/>
           </a:p>
@@ -2107,7 +2107,7 @@
           <a:p>
             <a:fld id="{66FB8743-300C-4536-BAF1-F7DDC023FD1F}" type="datetimeFigureOut">
               <a:rPr lang="en-GB" smtClean="0"/>
-              <a:t>09/02/2024</a:t>
+              <a:t>16/02/2024</a:t>
             </a:fld>
             <a:endParaRPr lang="en-GB"/>
           </a:p>
@@ -2364,7 +2364,7 @@
           <a:p>
             <a:fld id="{66FB8743-300C-4536-BAF1-F7DDC023FD1F}" type="datetimeFigureOut">
               <a:rPr lang="en-GB" smtClean="0"/>
-              <a:t>09/02/2024</a:t>
+              <a:t>16/02/2024</a:t>
             </a:fld>
             <a:endParaRPr lang="en-GB"/>
           </a:p>
@@ -2577,7 +2577,7 @@
           <a:p>
             <a:fld id="{66FB8743-300C-4536-BAF1-F7DDC023FD1F}" type="datetimeFigureOut">
               <a:rPr lang="en-GB" smtClean="0"/>
-              <a:t>09/02/2024</a:t>
+              <a:t>16/02/2024</a:t>
             </a:fld>
             <a:endParaRPr lang="en-GB"/>
           </a:p>
@@ -3394,7 +3394,11 @@
           </a:p>
           <a:p>
             <a:r>
-              <a:rPr lang="en-GB" dirty="0"/>
+              <a:rPr lang="en-GB" dirty="0">
+                <a:solidFill>
+                  <a:schemeClr val="accent6"/>
+                </a:solidFill>
+              </a:rPr>
               <a:t>What are the Focuses?</a:t>
             </a:r>
           </a:p>
@@ -3430,7 +3434,11 @@
           </a:p>
           <a:p>
             <a:r>
-              <a:rPr lang="en-GB" dirty="0"/>
+              <a:rPr lang="en-GB" dirty="0">
+                <a:solidFill>
+                  <a:schemeClr val="accent6"/>
+                </a:solidFill>
+              </a:rPr>
               <a:t>Why is it worthwhile / interesting</a:t>
             </a:r>
           </a:p>
@@ -3612,7 +3620,11 @@
           </a:p>
           <a:p>
             <a:r>
-              <a:rPr lang="en-GB" dirty="0"/>
+              <a:rPr lang="en-GB" dirty="0">
+                <a:solidFill>
+                  <a:schemeClr val="accent6"/>
+                </a:solidFill>
+              </a:rPr>
               <a:t>What does your project do (does it do anything differently?)</a:t>
             </a:r>
           </a:p>
@@ -3758,19 +3770,63 @@
           <a:lstStyle/>
           <a:p>
             <a:r>
-              <a:rPr lang="en-GB" dirty="0"/>
-              <a:t>Laws</a:t>
-            </a:r>
-          </a:p>
-          <a:p>
-            <a:r>
-              <a:rPr lang="en-GB" dirty="0"/>
+              <a:rPr lang="en-GB" dirty="0">
+                <a:solidFill>
+                  <a:schemeClr val="accent2"/>
+                </a:solidFill>
+              </a:rPr>
+              <a:t>Laws and guidelines</a:t>
+            </a:r>
+          </a:p>
+          <a:p>
+            <a:pPr lvl="1"/>
+            <a:r>
+              <a:rPr lang="en-GB" dirty="0">
+                <a:solidFill>
+                  <a:schemeClr val="accent6"/>
+                </a:solidFill>
+              </a:rPr>
+              <a:t>What are these laws /guidelines</a:t>
+            </a:r>
+          </a:p>
+          <a:p>
+            <a:pPr lvl="1"/>
+            <a:r>
+              <a:rPr lang="en-GB" dirty="0">
+                <a:solidFill>
+                  <a:schemeClr val="accent6"/>
+                </a:solidFill>
+              </a:rPr>
+              <a:t>What about the project is affected</a:t>
+            </a:r>
+          </a:p>
+          <a:p>
+            <a:r>
+              <a:rPr lang="en-GB" dirty="0">
+                <a:solidFill>
+                  <a:schemeClr val="accent6"/>
+                </a:solidFill>
+              </a:rPr>
               <a:t>Sussex (code of ethics)</a:t>
             </a:r>
           </a:p>
           <a:p>
             <a:r>
-              <a:rPr lang="en-GB" dirty="0"/>
+              <a:rPr lang="en-GB" dirty="0">
+                <a:solidFill>
+                  <a:schemeClr val="accent6"/>
+                </a:solidFill>
+              </a:rPr>
+              <a:t>BCS</a:t>
+            </a:r>
+          </a:p>
+          <a:p>
+            <a:r>
+              <a:rPr lang="en-GB" dirty="0">
+                <a:solidFill>
+                  <a:schemeClr val="accent4"/>
+                </a:solidFill>
+              </a:rPr>
               <a:t>Your Solutions to Ethical Problems</a:t>
             </a:r>
           </a:p>

</xml_diff>

<commit_message>
vault backup: 2024-03-14 11:20:54
</commit_message>
<xml_diff>
--- a/Report Topics.pptx
+++ b/Report Topics.pptx
@@ -252,7 +252,7 @@
           <a:p>
             <a:fld id="{66FB8743-300C-4536-BAF1-F7DDC023FD1F}" type="datetimeFigureOut">
               <a:rPr lang="en-GB" smtClean="0"/>
-              <a:t>16/02/2024</a:t>
+              <a:t>06/03/2024</a:t>
             </a:fld>
             <a:endParaRPr lang="en-GB"/>
           </a:p>
@@ -422,7 +422,7 @@
           <a:p>
             <a:fld id="{66FB8743-300C-4536-BAF1-F7DDC023FD1F}" type="datetimeFigureOut">
               <a:rPr lang="en-GB" smtClean="0"/>
-              <a:t>16/02/2024</a:t>
+              <a:t>06/03/2024</a:t>
             </a:fld>
             <a:endParaRPr lang="en-GB"/>
           </a:p>
@@ -602,7 +602,7 @@
           <a:p>
             <a:fld id="{66FB8743-300C-4536-BAF1-F7DDC023FD1F}" type="datetimeFigureOut">
               <a:rPr lang="en-GB" smtClean="0"/>
-              <a:t>16/02/2024</a:t>
+              <a:t>06/03/2024</a:t>
             </a:fld>
             <a:endParaRPr lang="en-GB"/>
           </a:p>
@@ -772,7 +772,7 @@
           <a:p>
             <a:fld id="{66FB8743-300C-4536-BAF1-F7DDC023FD1F}" type="datetimeFigureOut">
               <a:rPr lang="en-GB" smtClean="0"/>
-              <a:t>16/02/2024</a:t>
+              <a:t>06/03/2024</a:t>
             </a:fld>
             <a:endParaRPr lang="en-GB"/>
           </a:p>
@@ -1018,7 +1018,7 @@
           <a:p>
             <a:fld id="{66FB8743-300C-4536-BAF1-F7DDC023FD1F}" type="datetimeFigureOut">
               <a:rPr lang="en-GB" smtClean="0"/>
-              <a:t>16/02/2024</a:t>
+              <a:t>06/03/2024</a:t>
             </a:fld>
             <a:endParaRPr lang="en-GB"/>
           </a:p>
@@ -1250,7 +1250,7 @@
           <a:p>
             <a:fld id="{66FB8743-300C-4536-BAF1-F7DDC023FD1F}" type="datetimeFigureOut">
               <a:rPr lang="en-GB" smtClean="0"/>
-              <a:t>16/02/2024</a:t>
+              <a:t>06/03/2024</a:t>
             </a:fld>
             <a:endParaRPr lang="en-GB"/>
           </a:p>
@@ -1617,7 +1617,7 @@
           <a:p>
             <a:fld id="{66FB8743-300C-4536-BAF1-F7DDC023FD1F}" type="datetimeFigureOut">
               <a:rPr lang="en-GB" smtClean="0"/>
-              <a:t>16/02/2024</a:t>
+              <a:t>06/03/2024</a:t>
             </a:fld>
             <a:endParaRPr lang="en-GB"/>
           </a:p>
@@ -1735,7 +1735,7 @@
           <a:p>
             <a:fld id="{66FB8743-300C-4536-BAF1-F7DDC023FD1F}" type="datetimeFigureOut">
               <a:rPr lang="en-GB" smtClean="0"/>
-              <a:t>16/02/2024</a:t>
+              <a:t>06/03/2024</a:t>
             </a:fld>
             <a:endParaRPr lang="en-GB"/>
           </a:p>
@@ -1830,7 +1830,7 @@
           <a:p>
             <a:fld id="{66FB8743-300C-4536-BAF1-F7DDC023FD1F}" type="datetimeFigureOut">
               <a:rPr lang="en-GB" smtClean="0"/>
-              <a:t>16/02/2024</a:t>
+              <a:t>06/03/2024</a:t>
             </a:fld>
             <a:endParaRPr lang="en-GB"/>
           </a:p>
@@ -2107,7 +2107,7 @@
           <a:p>
             <a:fld id="{66FB8743-300C-4536-BAF1-F7DDC023FD1F}" type="datetimeFigureOut">
               <a:rPr lang="en-GB" smtClean="0"/>
-              <a:t>16/02/2024</a:t>
+              <a:t>06/03/2024</a:t>
             </a:fld>
             <a:endParaRPr lang="en-GB"/>
           </a:p>
@@ -2364,7 +2364,7 @@
           <a:p>
             <a:fld id="{66FB8743-300C-4536-BAF1-F7DDC023FD1F}" type="datetimeFigureOut">
               <a:rPr lang="en-GB" smtClean="0"/>
-              <a:t>16/02/2024</a:t>
+              <a:t>06/03/2024</a:t>
             </a:fld>
             <a:endParaRPr lang="en-GB"/>
           </a:p>
@@ -2577,7 +2577,7 @@
           <a:p>
             <a:fld id="{66FB8743-300C-4536-BAF1-F7DDC023FD1F}" type="datetimeFigureOut">
               <a:rPr lang="en-GB" smtClean="0"/>
-              <a:t>16/02/2024</a:t>
+              <a:t>06/03/2024</a:t>
             </a:fld>
             <a:endParaRPr lang="en-GB"/>
           </a:p>
@@ -3955,46 +3955,31 @@
           <a:lstStyle/>
           <a:p>
             <a:r>
-              <a:rPr lang="en-GB" dirty="0"/>
+              <a:rPr lang="en-GB" dirty="0">
+                <a:solidFill>
+                  <a:schemeClr val="accent6"/>
+                </a:solidFill>
+              </a:rPr>
               <a:t>Generate designs on how the project will work</a:t>
             </a:r>
           </a:p>
           <a:p>
             <a:r>
-              <a:rPr lang="en-GB" dirty="0"/>
+              <a:rPr lang="en-GB" dirty="0">
+                <a:solidFill>
+                  <a:schemeClr val="accent6"/>
+                </a:solidFill>
+              </a:rPr>
               <a:t>Diagrams</a:t>
             </a:r>
           </a:p>
           <a:p>
-            <a:pPr lvl="1"/>
-            <a:r>
-              <a:rPr lang="en-GB" dirty="0"/>
-              <a:t>Low Level</a:t>
-            </a:r>
-          </a:p>
-          <a:p>
-            <a:pPr lvl="1"/>
-            <a:r>
-              <a:rPr lang="en-GB" dirty="0"/>
-              <a:t>Mid-Level</a:t>
-            </a:r>
-          </a:p>
-          <a:p>
-            <a:pPr lvl="1"/>
-            <a:r>
-              <a:rPr lang="en-GB" dirty="0"/>
-              <a:t>High Level</a:t>
-            </a:r>
-          </a:p>
-          <a:p>
-            <a:r>
-              <a:rPr lang="en-GB" dirty="0"/>
-              <a:t>Mock version</a:t>
-            </a:r>
-          </a:p>
-          <a:p>
-            <a:r>
-              <a:rPr lang="en-GB" dirty="0"/>
+            <a:r>
+              <a:rPr lang="en-GB" dirty="0">
+                <a:solidFill>
+                  <a:schemeClr val="accent6"/>
+                </a:solidFill>
+              </a:rPr>
               <a:t>UI example</a:t>
             </a:r>
           </a:p>
@@ -4126,13 +4111,31 @@
           <a:lstStyle/>
           <a:p>
             <a:r>
-              <a:rPr lang="en-GB" dirty="0"/>
-              <a:t>Prototypes</a:t>
-            </a:r>
-          </a:p>
-          <a:p>
-            <a:r>
-              <a:rPr lang="en-GB" dirty="0"/>
+              <a:rPr lang="en-GB" dirty="0">
+                <a:solidFill>
+                  <a:schemeClr val="accent6"/>
+                </a:solidFill>
+              </a:rPr>
+              <a:t>How Does it Work</a:t>
+            </a:r>
+          </a:p>
+          <a:p>
+            <a:r>
+              <a:rPr lang="en-GB" dirty="0">
+                <a:solidFill>
+                  <a:schemeClr val="accent6"/>
+                </a:solidFill>
+              </a:rPr>
+              <a:t>Prototype UI</a:t>
+            </a:r>
+          </a:p>
+          <a:p>
+            <a:r>
+              <a:rPr lang="en-GB" dirty="0">
+                <a:solidFill>
+                  <a:schemeClr val="accent6"/>
+                </a:solidFill>
+              </a:rPr>
               <a:t>Different Ways of doing things?</a:t>
             </a:r>
           </a:p>

</xml_diff>

<commit_message>
vault backup: 2024-03-15 08:30:19
</commit_message>
<xml_diff>
--- a/Report Topics.pptx
+++ b/Report Topics.pptx
@@ -252,7 +252,7 @@
           <a:p>
             <a:fld id="{66FB8743-300C-4536-BAF1-F7DDC023FD1F}" type="datetimeFigureOut">
               <a:rPr lang="en-GB" smtClean="0"/>
-              <a:t>06/03/2024</a:t>
+              <a:t>14/03/2024</a:t>
             </a:fld>
             <a:endParaRPr lang="en-GB"/>
           </a:p>
@@ -422,7 +422,7 @@
           <a:p>
             <a:fld id="{66FB8743-300C-4536-BAF1-F7DDC023FD1F}" type="datetimeFigureOut">
               <a:rPr lang="en-GB" smtClean="0"/>
-              <a:t>06/03/2024</a:t>
+              <a:t>14/03/2024</a:t>
             </a:fld>
             <a:endParaRPr lang="en-GB"/>
           </a:p>
@@ -602,7 +602,7 @@
           <a:p>
             <a:fld id="{66FB8743-300C-4536-BAF1-F7DDC023FD1F}" type="datetimeFigureOut">
               <a:rPr lang="en-GB" smtClean="0"/>
-              <a:t>06/03/2024</a:t>
+              <a:t>14/03/2024</a:t>
             </a:fld>
             <a:endParaRPr lang="en-GB"/>
           </a:p>
@@ -772,7 +772,7 @@
           <a:p>
             <a:fld id="{66FB8743-300C-4536-BAF1-F7DDC023FD1F}" type="datetimeFigureOut">
               <a:rPr lang="en-GB" smtClean="0"/>
-              <a:t>06/03/2024</a:t>
+              <a:t>14/03/2024</a:t>
             </a:fld>
             <a:endParaRPr lang="en-GB"/>
           </a:p>
@@ -1018,7 +1018,7 @@
           <a:p>
             <a:fld id="{66FB8743-300C-4536-BAF1-F7DDC023FD1F}" type="datetimeFigureOut">
               <a:rPr lang="en-GB" smtClean="0"/>
-              <a:t>06/03/2024</a:t>
+              <a:t>14/03/2024</a:t>
             </a:fld>
             <a:endParaRPr lang="en-GB"/>
           </a:p>
@@ -1250,7 +1250,7 @@
           <a:p>
             <a:fld id="{66FB8743-300C-4536-BAF1-F7DDC023FD1F}" type="datetimeFigureOut">
               <a:rPr lang="en-GB" smtClean="0"/>
-              <a:t>06/03/2024</a:t>
+              <a:t>14/03/2024</a:t>
             </a:fld>
             <a:endParaRPr lang="en-GB"/>
           </a:p>
@@ -1617,7 +1617,7 @@
           <a:p>
             <a:fld id="{66FB8743-300C-4536-BAF1-F7DDC023FD1F}" type="datetimeFigureOut">
               <a:rPr lang="en-GB" smtClean="0"/>
-              <a:t>06/03/2024</a:t>
+              <a:t>14/03/2024</a:t>
             </a:fld>
             <a:endParaRPr lang="en-GB"/>
           </a:p>
@@ -1735,7 +1735,7 @@
           <a:p>
             <a:fld id="{66FB8743-300C-4536-BAF1-F7DDC023FD1F}" type="datetimeFigureOut">
               <a:rPr lang="en-GB" smtClean="0"/>
-              <a:t>06/03/2024</a:t>
+              <a:t>14/03/2024</a:t>
             </a:fld>
             <a:endParaRPr lang="en-GB"/>
           </a:p>
@@ -1830,7 +1830,7 @@
           <a:p>
             <a:fld id="{66FB8743-300C-4536-BAF1-F7DDC023FD1F}" type="datetimeFigureOut">
               <a:rPr lang="en-GB" smtClean="0"/>
-              <a:t>06/03/2024</a:t>
+              <a:t>14/03/2024</a:t>
             </a:fld>
             <a:endParaRPr lang="en-GB"/>
           </a:p>
@@ -2107,7 +2107,7 @@
           <a:p>
             <a:fld id="{66FB8743-300C-4536-BAF1-F7DDC023FD1F}" type="datetimeFigureOut">
               <a:rPr lang="en-GB" smtClean="0"/>
-              <a:t>06/03/2024</a:t>
+              <a:t>14/03/2024</a:t>
             </a:fld>
             <a:endParaRPr lang="en-GB"/>
           </a:p>
@@ -2364,7 +2364,7 @@
           <a:p>
             <a:fld id="{66FB8743-300C-4536-BAF1-F7DDC023FD1F}" type="datetimeFigureOut">
               <a:rPr lang="en-GB" smtClean="0"/>
-              <a:t>06/03/2024</a:t>
+              <a:t>14/03/2024</a:t>
             </a:fld>
             <a:endParaRPr lang="en-GB"/>
           </a:p>
@@ -2577,7 +2577,7 @@
           <a:p>
             <a:fld id="{66FB8743-300C-4536-BAF1-F7DDC023FD1F}" type="datetimeFigureOut">
               <a:rPr lang="en-GB" smtClean="0"/>
-              <a:t>06/03/2024</a:t>
+              <a:t>14/03/2024</a:t>
             </a:fld>
             <a:endParaRPr lang="en-GB"/>
           </a:p>
@@ -4258,19 +4258,31 @@
           <a:lstStyle/>
           <a:p>
             <a:r>
-              <a:rPr lang="en-GB" dirty="0"/>
+              <a:rPr lang="en-GB" dirty="0">
+                <a:solidFill>
+                  <a:schemeClr val="accent6"/>
+                </a:solidFill>
+              </a:rPr>
               <a:t>What Limitations are there</a:t>
             </a:r>
           </a:p>
           <a:p>
             <a:r>
-              <a:rPr lang="en-GB" dirty="0"/>
+              <a:rPr lang="en-GB" dirty="0">
+                <a:solidFill>
+                  <a:schemeClr val="accent6"/>
+                </a:solidFill>
+              </a:rPr>
               <a:t>What did you do about them</a:t>
             </a:r>
           </a:p>
           <a:p>
             <a:r>
-              <a:rPr lang="en-GB" dirty="0"/>
+              <a:rPr lang="en-GB" dirty="0">
+                <a:solidFill>
+                  <a:schemeClr val="accent6"/>
+                </a:solidFill>
+              </a:rPr>
               <a:t>What does your project do vs how did you Invision it to do things</a:t>
             </a:r>
           </a:p>

</xml_diff>

<commit_message>
vault backup: 2024-03-21 17:20:36
</commit_message>
<xml_diff>
--- a/Report Topics.pptx
+++ b/Report Topics.pptx
@@ -252,7 +252,7 @@
           <a:p>
             <a:fld id="{66FB8743-300C-4536-BAF1-F7DDC023FD1F}" type="datetimeFigureOut">
               <a:rPr lang="en-GB" smtClean="0"/>
-              <a:t>14/03/2024</a:t>
+              <a:t>20/03/2024</a:t>
             </a:fld>
             <a:endParaRPr lang="en-GB"/>
           </a:p>
@@ -422,7 +422,7 @@
           <a:p>
             <a:fld id="{66FB8743-300C-4536-BAF1-F7DDC023FD1F}" type="datetimeFigureOut">
               <a:rPr lang="en-GB" smtClean="0"/>
-              <a:t>14/03/2024</a:t>
+              <a:t>20/03/2024</a:t>
             </a:fld>
             <a:endParaRPr lang="en-GB"/>
           </a:p>
@@ -602,7 +602,7 @@
           <a:p>
             <a:fld id="{66FB8743-300C-4536-BAF1-F7DDC023FD1F}" type="datetimeFigureOut">
               <a:rPr lang="en-GB" smtClean="0"/>
-              <a:t>14/03/2024</a:t>
+              <a:t>20/03/2024</a:t>
             </a:fld>
             <a:endParaRPr lang="en-GB"/>
           </a:p>
@@ -772,7 +772,7 @@
           <a:p>
             <a:fld id="{66FB8743-300C-4536-BAF1-F7DDC023FD1F}" type="datetimeFigureOut">
               <a:rPr lang="en-GB" smtClean="0"/>
-              <a:t>14/03/2024</a:t>
+              <a:t>20/03/2024</a:t>
             </a:fld>
             <a:endParaRPr lang="en-GB"/>
           </a:p>
@@ -1018,7 +1018,7 @@
           <a:p>
             <a:fld id="{66FB8743-300C-4536-BAF1-F7DDC023FD1F}" type="datetimeFigureOut">
               <a:rPr lang="en-GB" smtClean="0"/>
-              <a:t>14/03/2024</a:t>
+              <a:t>20/03/2024</a:t>
             </a:fld>
             <a:endParaRPr lang="en-GB"/>
           </a:p>
@@ -1250,7 +1250,7 @@
           <a:p>
             <a:fld id="{66FB8743-300C-4536-BAF1-F7DDC023FD1F}" type="datetimeFigureOut">
               <a:rPr lang="en-GB" smtClean="0"/>
-              <a:t>14/03/2024</a:t>
+              <a:t>20/03/2024</a:t>
             </a:fld>
             <a:endParaRPr lang="en-GB"/>
           </a:p>
@@ -1617,7 +1617,7 @@
           <a:p>
             <a:fld id="{66FB8743-300C-4536-BAF1-F7DDC023FD1F}" type="datetimeFigureOut">
               <a:rPr lang="en-GB" smtClean="0"/>
-              <a:t>14/03/2024</a:t>
+              <a:t>20/03/2024</a:t>
             </a:fld>
             <a:endParaRPr lang="en-GB"/>
           </a:p>
@@ -1735,7 +1735,7 @@
           <a:p>
             <a:fld id="{66FB8743-300C-4536-BAF1-F7DDC023FD1F}" type="datetimeFigureOut">
               <a:rPr lang="en-GB" smtClean="0"/>
-              <a:t>14/03/2024</a:t>
+              <a:t>20/03/2024</a:t>
             </a:fld>
             <a:endParaRPr lang="en-GB"/>
           </a:p>
@@ -1830,7 +1830,7 @@
           <a:p>
             <a:fld id="{66FB8743-300C-4536-BAF1-F7DDC023FD1F}" type="datetimeFigureOut">
               <a:rPr lang="en-GB" smtClean="0"/>
-              <a:t>14/03/2024</a:t>
+              <a:t>20/03/2024</a:t>
             </a:fld>
             <a:endParaRPr lang="en-GB"/>
           </a:p>
@@ -2107,7 +2107,7 @@
           <a:p>
             <a:fld id="{66FB8743-300C-4536-BAF1-F7DDC023FD1F}" type="datetimeFigureOut">
               <a:rPr lang="en-GB" smtClean="0"/>
-              <a:t>14/03/2024</a:t>
+              <a:t>20/03/2024</a:t>
             </a:fld>
             <a:endParaRPr lang="en-GB"/>
           </a:p>
@@ -2364,7 +2364,7 @@
           <a:p>
             <a:fld id="{66FB8743-300C-4536-BAF1-F7DDC023FD1F}" type="datetimeFigureOut">
               <a:rPr lang="en-GB" smtClean="0"/>
-              <a:t>14/03/2024</a:t>
+              <a:t>20/03/2024</a:t>
             </a:fld>
             <a:endParaRPr lang="en-GB"/>
           </a:p>
@@ -2577,7 +2577,7 @@
           <a:p>
             <a:fld id="{66FB8743-300C-4536-BAF1-F7DDC023FD1F}" type="datetimeFigureOut">
               <a:rPr lang="en-GB" smtClean="0"/>
-              <a:t>14/03/2024</a:t>
+              <a:t>20/03/2024</a:t>
             </a:fld>
             <a:endParaRPr lang="en-GB"/>
           </a:p>
@@ -4543,43 +4543,71 @@
           <a:lstStyle/>
           <a:p>
             <a:r>
-              <a:rPr lang="en-GB" dirty="0"/>
+              <a:rPr lang="en-GB" dirty="0">
+                <a:solidFill>
+                  <a:schemeClr val="accent6"/>
+                </a:solidFill>
+              </a:rPr>
               <a:t>Explain the problem</a:t>
             </a:r>
           </a:p>
           <a:p>
             <a:r>
-              <a:rPr lang="en-GB" dirty="0"/>
+              <a:rPr lang="en-GB" dirty="0">
+                <a:solidFill>
+                  <a:schemeClr val="accent6"/>
+                </a:solidFill>
+              </a:rPr>
               <a:t>Explain the solution</a:t>
             </a:r>
           </a:p>
           <a:p>
             <a:r>
-              <a:rPr lang="en-GB" dirty="0"/>
+              <a:rPr lang="en-GB" dirty="0">
+                <a:solidFill>
+                  <a:schemeClr val="accent6"/>
+                </a:solidFill>
+              </a:rPr>
               <a:t>Explain why it matters</a:t>
             </a:r>
           </a:p>
           <a:p>
             <a:r>
-              <a:rPr lang="en-GB" dirty="0"/>
+              <a:rPr lang="en-GB" dirty="0">
+                <a:solidFill>
+                  <a:schemeClr val="accent6"/>
+                </a:solidFill>
+              </a:rPr>
               <a:t>Why is this solution best</a:t>
             </a:r>
           </a:p>
           <a:p>
             <a:r>
-              <a:rPr lang="en-GB" dirty="0"/>
+              <a:rPr lang="en-GB" dirty="0">
+                <a:solidFill>
+                  <a:schemeClr val="accent6"/>
+                </a:solidFill>
+              </a:rPr>
               <a:t>What other things could be done  Better</a:t>
             </a:r>
           </a:p>
           <a:p>
             <a:r>
-              <a:rPr lang="en-GB" dirty="0"/>
+              <a:rPr lang="en-GB" dirty="0">
+                <a:solidFill>
+                  <a:schemeClr val="accent6"/>
+                </a:solidFill>
+              </a:rPr>
               <a:t>How well does it work </a:t>
             </a:r>
           </a:p>
           <a:p>
             <a:r>
-              <a:rPr lang="en-GB" dirty="0"/>
+              <a:rPr lang="en-GB" dirty="0">
+                <a:solidFill>
+                  <a:schemeClr val="accent6"/>
+                </a:solidFill>
+              </a:rPr>
               <a:t>Does it work in the desired way</a:t>
             </a:r>
           </a:p>

</xml_diff>

<commit_message>
vault backup: 2024-03-26 15:44:29
</commit_message>
<xml_diff>
--- a/Report Topics.pptx
+++ b/Report Topics.pptx
@@ -252,7 +252,7 @@
           <a:p>
             <a:fld id="{66FB8743-300C-4536-BAF1-F7DDC023FD1F}" type="datetimeFigureOut">
               <a:rPr lang="en-GB" smtClean="0"/>
-              <a:t>20/03/2024</a:t>
+              <a:t>25/03/2024</a:t>
             </a:fld>
             <a:endParaRPr lang="en-GB"/>
           </a:p>
@@ -422,7 +422,7 @@
           <a:p>
             <a:fld id="{66FB8743-300C-4536-BAF1-F7DDC023FD1F}" type="datetimeFigureOut">
               <a:rPr lang="en-GB" smtClean="0"/>
-              <a:t>20/03/2024</a:t>
+              <a:t>25/03/2024</a:t>
             </a:fld>
             <a:endParaRPr lang="en-GB"/>
           </a:p>
@@ -602,7 +602,7 @@
           <a:p>
             <a:fld id="{66FB8743-300C-4536-BAF1-F7DDC023FD1F}" type="datetimeFigureOut">
               <a:rPr lang="en-GB" smtClean="0"/>
-              <a:t>20/03/2024</a:t>
+              <a:t>25/03/2024</a:t>
             </a:fld>
             <a:endParaRPr lang="en-GB"/>
           </a:p>
@@ -772,7 +772,7 @@
           <a:p>
             <a:fld id="{66FB8743-300C-4536-BAF1-F7DDC023FD1F}" type="datetimeFigureOut">
               <a:rPr lang="en-GB" smtClean="0"/>
-              <a:t>20/03/2024</a:t>
+              <a:t>25/03/2024</a:t>
             </a:fld>
             <a:endParaRPr lang="en-GB"/>
           </a:p>
@@ -1018,7 +1018,7 @@
           <a:p>
             <a:fld id="{66FB8743-300C-4536-BAF1-F7DDC023FD1F}" type="datetimeFigureOut">
               <a:rPr lang="en-GB" smtClean="0"/>
-              <a:t>20/03/2024</a:t>
+              <a:t>25/03/2024</a:t>
             </a:fld>
             <a:endParaRPr lang="en-GB"/>
           </a:p>
@@ -1250,7 +1250,7 @@
           <a:p>
             <a:fld id="{66FB8743-300C-4536-BAF1-F7DDC023FD1F}" type="datetimeFigureOut">
               <a:rPr lang="en-GB" smtClean="0"/>
-              <a:t>20/03/2024</a:t>
+              <a:t>25/03/2024</a:t>
             </a:fld>
             <a:endParaRPr lang="en-GB"/>
           </a:p>
@@ -1617,7 +1617,7 @@
           <a:p>
             <a:fld id="{66FB8743-300C-4536-BAF1-F7DDC023FD1F}" type="datetimeFigureOut">
               <a:rPr lang="en-GB" smtClean="0"/>
-              <a:t>20/03/2024</a:t>
+              <a:t>25/03/2024</a:t>
             </a:fld>
             <a:endParaRPr lang="en-GB"/>
           </a:p>
@@ -1735,7 +1735,7 @@
           <a:p>
             <a:fld id="{66FB8743-300C-4536-BAF1-F7DDC023FD1F}" type="datetimeFigureOut">
               <a:rPr lang="en-GB" smtClean="0"/>
-              <a:t>20/03/2024</a:t>
+              <a:t>25/03/2024</a:t>
             </a:fld>
             <a:endParaRPr lang="en-GB"/>
           </a:p>
@@ -1830,7 +1830,7 @@
           <a:p>
             <a:fld id="{66FB8743-300C-4536-BAF1-F7DDC023FD1F}" type="datetimeFigureOut">
               <a:rPr lang="en-GB" smtClean="0"/>
-              <a:t>20/03/2024</a:t>
+              <a:t>25/03/2024</a:t>
             </a:fld>
             <a:endParaRPr lang="en-GB"/>
           </a:p>
@@ -2107,7 +2107,7 @@
           <a:p>
             <a:fld id="{66FB8743-300C-4536-BAF1-F7DDC023FD1F}" type="datetimeFigureOut">
               <a:rPr lang="en-GB" smtClean="0"/>
-              <a:t>20/03/2024</a:t>
+              <a:t>25/03/2024</a:t>
             </a:fld>
             <a:endParaRPr lang="en-GB"/>
           </a:p>
@@ -2364,7 +2364,7 @@
           <a:p>
             <a:fld id="{66FB8743-300C-4536-BAF1-F7DDC023FD1F}" type="datetimeFigureOut">
               <a:rPr lang="en-GB" smtClean="0"/>
-              <a:t>20/03/2024</a:t>
+              <a:t>25/03/2024</a:t>
             </a:fld>
             <a:endParaRPr lang="en-GB"/>
           </a:p>
@@ -2577,7 +2577,7 @@
           <a:p>
             <a:fld id="{66FB8743-300C-4536-BAF1-F7DDC023FD1F}" type="datetimeFigureOut">
               <a:rPr lang="en-GB" smtClean="0"/>
-              <a:t>20/03/2024</a:t>
+              <a:t>25/03/2024</a:t>
             </a:fld>
             <a:endParaRPr lang="en-GB"/>
           </a:p>
@@ -3147,7 +3147,7 @@
         </p:nvSpPr>
         <p:spPr>
           <a:xfrm>
-            <a:off x="6172200" y="1835052"/>
+            <a:off x="5021140" y="2079625"/>
             <a:ext cx="5181600" cy="4351338"/>
           </a:xfrm>
         </p:spPr>

</xml_diff>

<commit_message>
vault backup: 2024-03-28 12:26:40
</commit_message>
<xml_diff>
--- a/Report Topics.pptx
+++ b/Report Topics.pptx
@@ -252,7 +252,7 @@
           <a:p>
             <a:fld id="{66FB8743-300C-4536-BAF1-F7DDC023FD1F}" type="datetimeFigureOut">
               <a:rPr lang="en-GB" smtClean="0"/>
-              <a:t>25/03/2024</a:t>
+              <a:t>27/03/2024</a:t>
             </a:fld>
             <a:endParaRPr lang="en-GB"/>
           </a:p>
@@ -422,7 +422,7 @@
           <a:p>
             <a:fld id="{66FB8743-300C-4536-BAF1-F7DDC023FD1F}" type="datetimeFigureOut">
               <a:rPr lang="en-GB" smtClean="0"/>
-              <a:t>25/03/2024</a:t>
+              <a:t>27/03/2024</a:t>
             </a:fld>
             <a:endParaRPr lang="en-GB"/>
           </a:p>
@@ -602,7 +602,7 @@
           <a:p>
             <a:fld id="{66FB8743-300C-4536-BAF1-F7DDC023FD1F}" type="datetimeFigureOut">
               <a:rPr lang="en-GB" smtClean="0"/>
-              <a:t>25/03/2024</a:t>
+              <a:t>27/03/2024</a:t>
             </a:fld>
             <a:endParaRPr lang="en-GB"/>
           </a:p>
@@ -772,7 +772,7 @@
           <a:p>
             <a:fld id="{66FB8743-300C-4536-BAF1-F7DDC023FD1F}" type="datetimeFigureOut">
               <a:rPr lang="en-GB" smtClean="0"/>
-              <a:t>25/03/2024</a:t>
+              <a:t>27/03/2024</a:t>
             </a:fld>
             <a:endParaRPr lang="en-GB"/>
           </a:p>
@@ -1018,7 +1018,7 @@
           <a:p>
             <a:fld id="{66FB8743-300C-4536-BAF1-F7DDC023FD1F}" type="datetimeFigureOut">
               <a:rPr lang="en-GB" smtClean="0"/>
-              <a:t>25/03/2024</a:t>
+              <a:t>27/03/2024</a:t>
             </a:fld>
             <a:endParaRPr lang="en-GB"/>
           </a:p>
@@ -1250,7 +1250,7 @@
           <a:p>
             <a:fld id="{66FB8743-300C-4536-BAF1-F7DDC023FD1F}" type="datetimeFigureOut">
               <a:rPr lang="en-GB" smtClean="0"/>
-              <a:t>25/03/2024</a:t>
+              <a:t>27/03/2024</a:t>
             </a:fld>
             <a:endParaRPr lang="en-GB"/>
           </a:p>
@@ -1617,7 +1617,7 @@
           <a:p>
             <a:fld id="{66FB8743-300C-4536-BAF1-F7DDC023FD1F}" type="datetimeFigureOut">
               <a:rPr lang="en-GB" smtClean="0"/>
-              <a:t>25/03/2024</a:t>
+              <a:t>27/03/2024</a:t>
             </a:fld>
             <a:endParaRPr lang="en-GB"/>
           </a:p>
@@ -1735,7 +1735,7 @@
           <a:p>
             <a:fld id="{66FB8743-300C-4536-BAF1-F7DDC023FD1F}" type="datetimeFigureOut">
               <a:rPr lang="en-GB" smtClean="0"/>
-              <a:t>25/03/2024</a:t>
+              <a:t>27/03/2024</a:t>
             </a:fld>
             <a:endParaRPr lang="en-GB"/>
           </a:p>
@@ -1830,7 +1830,7 @@
           <a:p>
             <a:fld id="{66FB8743-300C-4536-BAF1-F7DDC023FD1F}" type="datetimeFigureOut">
               <a:rPr lang="en-GB" smtClean="0"/>
-              <a:t>25/03/2024</a:t>
+              <a:t>27/03/2024</a:t>
             </a:fld>
             <a:endParaRPr lang="en-GB"/>
           </a:p>
@@ -2107,7 +2107,7 @@
           <a:p>
             <a:fld id="{66FB8743-300C-4536-BAF1-F7DDC023FD1F}" type="datetimeFigureOut">
               <a:rPr lang="en-GB" smtClean="0"/>
-              <a:t>25/03/2024</a:t>
+              <a:t>27/03/2024</a:t>
             </a:fld>
             <a:endParaRPr lang="en-GB"/>
           </a:p>
@@ -2364,7 +2364,7 @@
           <a:p>
             <a:fld id="{66FB8743-300C-4536-BAF1-F7DDC023FD1F}" type="datetimeFigureOut">
               <a:rPr lang="en-GB" smtClean="0"/>
-              <a:t>25/03/2024</a:t>
+              <a:t>27/03/2024</a:t>
             </a:fld>
             <a:endParaRPr lang="en-GB"/>
           </a:p>
@@ -2577,7 +2577,7 @@
           <a:p>
             <a:fld id="{66FB8743-300C-4536-BAF1-F7DDC023FD1F}" type="datetimeFigureOut">
               <a:rPr lang="en-GB" smtClean="0"/>
-              <a:t>25/03/2024</a:t>
+              <a:t>27/03/2024</a:t>
             </a:fld>
             <a:endParaRPr lang="en-GB"/>
           </a:p>
@@ -3250,7 +3250,11 @@
           <a:lstStyle/>
           <a:p>
             <a:r>
-              <a:rPr lang="en-GB" dirty="0"/>
+              <a:rPr lang="en-GB" dirty="0">
+                <a:solidFill>
+                  <a:schemeClr val="accent4"/>
+                </a:solidFill>
+              </a:rPr>
               <a:t>What design choices were made along the way</a:t>
             </a:r>
           </a:p>
@@ -3263,7 +3267,7 @@
           <a:p>
             <a:r>
               <a:rPr lang="en-GB" dirty="0"/>
-              <a:t>What was the cleverest part?</a:t>
+              <a:t>Further Work / Extensions</a:t>
             </a:r>
           </a:p>
           <a:p>
@@ -4414,19 +4418,31 @@
           <a:lstStyle/>
           <a:p>
             <a:r>
-              <a:rPr lang="en-GB" dirty="0"/>
+              <a:rPr lang="en-GB" dirty="0">
+                <a:solidFill>
+                  <a:schemeClr val="accent6"/>
+                </a:solidFill>
+              </a:rPr>
               <a:t>How did you test it</a:t>
             </a:r>
           </a:p>
           <a:p>
             <a:r>
-              <a:rPr lang="en-GB" dirty="0"/>
+              <a:rPr lang="en-GB" dirty="0">
+                <a:solidFill>
+                  <a:schemeClr val="accent6"/>
+                </a:solidFill>
+              </a:rPr>
               <a:t>What data did you test it on </a:t>
             </a:r>
           </a:p>
           <a:p>
             <a:r>
-              <a:rPr lang="en-GB" dirty="0"/>
+              <a:rPr lang="en-GB" dirty="0">
+                <a:solidFill>
+                  <a:schemeClr val="accent6"/>
+                </a:solidFill>
+              </a:rPr>
               <a:t>How did you get this data</a:t>
             </a:r>
           </a:p>

</xml_diff>